<commit_message>
fix readme, docs and ppt
</commit_message>
<xml_diff>
--- a/NighthawkOS初赛幻灯片.pptx
+++ b/NighthawkOS初赛幻灯片.pptx
@@ -15,6 +15,7 @@
     <p:sldId id="258" r:id="rId9"/>
     <p:sldId id="262" r:id="rId10"/>
     <p:sldId id="263" r:id="rId11"/>
+    <p:sldId id="267" r:id="rId12"/>
   </p:sldIdLst>
   <p:sldSz cx="12192000" cy="6858000"/>
   <p:notesSz cx="6858000" cy="9144000"/>
@@ -119,6 +120,18 @@
     </p:ext>
   </p:extLst>
 </p:presentation>
+</file>
+
+<file path=ppt/commentAuthors.xml><?xml version="1.0" encoding="utf-8"?>
+<p:cmAuthorLst xmlns:a="http://schemas.openxmlformats.org/drawingml/2006/main" xmlns:r="http://schemas.openxmlformats.org/officeDocument/2006/relationships" xmlns:p="http://schemas.openxmlformats.org/presentationml/2006/main">
+  <p:cmAuthor id="1" name="nika ipo" initials="ni" lastIdx="1" clrIdx="0">
+    <p:extLst>
+      <p:ext uri="{19B8F6BF-5375-455C-9EA6-DF929625EA0E}">
+        <p15:presenceInfo xmlns:p15="http://schemas.microsoft.com/office/powerpoint/2012/main" userId="650ba438c3aa5b3d" providerId="Windows Live"/>
+      </p:ext>
+    </p:extLst>
+  </p:cmAuthor>
+</p:cmAuthorLst>
 </file>
 
 <file path=ppt/slideLayouts/slideLayout1.xml><?xml version="1.0" encoding="utf-8"?>
@@ -4412,6 +4425,792 @@
 </p:sld>
 </file>
 
+<file path=ppt/slides/slide11.xml><?xml version="1.0" encoding="utf-8"?>
+<p:sld xmlns:a="http://schemas.openxmlformats.org/drawingml/2006/main" xmlns:r="http://schemas.openxmlformats.org/officeDocument/2006/relationships" xmlns:p="http://schemas.openxmlformats.org/presentationml/2006/main">
+  <p:cSld>
+    <p:spTree>
+      <p:nvGrpSpPr>
+        <p:cNvPr id="1" name="">
+          <a:extLst>
+            <a:ext uri="{FF2B5EF4-FFF2-40B4-BE49-F238E27FC236}">
+              <a16:creationId xmlns:a16="http://schemas.microsoft.com/office/drawing/2014/main" id="{5CCCB583-CAD6-1E18-A79E-82030EF4B762}"/>
+            </a:ext>
+          </a:extLst>
+        </p:cNvPr>
+        <p:cNvGrpSpPr/>
+        <p:nvPr/>
+      </p:nvGrpSpPr>
+      <p:grpSpPr>
+        <a:xfrm>
+          <a:off x="0" y="0"/>
+          <a:ext cx="0" cy="0"/>
+          <a:chOff x="0" y="0"/>
+          <a:chExt cx="0" cy="0"/>
+        </a:xfrm>
+      </p:grpSpPr>
+      <p:grpSp>
+        <p:nvGrpSpPr>
+          <p:cNvPr id="4" name="组合 3">
+            <a:extLst>
+              <a:ext uri="{FF2B5EF4-FFF2-40B4-BE49-F238E27FC236}">
+                <a16:creationId xmlns:a16="http://schemas.microsoft.com/office/drawing/2014/main" id="{53FDA77A-4F5F-7537-A5CF-14544E90A9A2}"/>
+              </a:ext>
+            </a:extLst>
+          </p:cNvPr>
+          <p:cNvGrpSpPr/>
+          <p:nvPr/>
+        </p:nvGrpSpPr>
+        <p:grpSpPr>
+          <a:xfrm>
+            <a:off x="-4216" y="-7"/>
+            <a:ext cx="12192000" cy="637081"/>
+            <a:chOff x="-4216" y="-7"/>
+            <a:chExt cx="12192000" cy="637081"/>
+          </a:xfrm>
+        </p:grpSpPr>
+        <p:sp>
+          <p:nvSpPr>
+            <p:cNvPr id="5" name="矩形 4">
+              <a:extLst>
+                <a:ext uri="{FF2B5EF4-FFF2-40B4-BE49-F238E27FC236}">
+                  <a16:creationId xmlns:a16="http://schemas.microsoft.com/office/drawing/2014/main" id="{5AD4EB56-F6F5-FFD7-4A72-088FCB12A331}"/>
+                </a:ext>
+              </a:extLst>
+            </p:cNvPr>
+            <p:cNvSpPr/>
+            <p:nvPr/>
+          </p:nvSpPr>
+          <p:spPr>
+            <a:xfrm>
+              <a:off x="-4216" y="0"/>
+              <a:ext cx="12192000" cy="637074"/>
+            </a:xfrm>
+            <a:prstGeom prst="rect">
+              <a:avLst/>
+            </a:prstGeom>
+            <a:solidFill>
+              <a:schemeClr val="bg1">
+                <a:lumMod val="95000"/>
+              </a:schemeClr>
+            </a:solidFill>
+            <a:ln>
+              <a:noFill/>
+            </a:ln>
+            <a:effectLst>
+              <a:outerShdw blurRad="228600" dist="50800" dir="5400000" algn="t" rotWithShape="0">
+                <a:prstClr val="black">
+                  <a:alpha val="29000"/>
+                </a:prstClr>
+              </a:outerShdw>
+            </a:effectLst>
+          </p:spPr>
+          <p:style>
+            <a:lnRef idx="2">
+              <a:schemeClr val="accent1">
+                <a:shade val="50000"/>
+              </a:schemeClr>
+            </a:lnRef>
+            <a:fillRef idx="1">
+              <a:schemeClr val="accent1"/>
+            </a:fillRef>
+            <a:effectRef idx="0">
+              <a:schemeClr val="accent1"/>
+            </a:effectRef>
+            <a:fontRef idx="minor">
+              <a:schemeClr val="lt1"/>
+            </a:fontRef>
+          </p:style>
+          <p:txBody>
+            <a:bodyPr rtlCol="0" anchor="ctr"/>
+            <a:lstStyle/>
+            <a:p>
+              <a:pPr algn="ctr"/>
+              <a:endParaRPr lang="zh-CN" altLang="en-US" sz="2880"/>
+            </a:p>
+          </p:txBody>
+        </p:sp>
+        <p:sp>
+          <p:nvSpPr>
+            <p:cNvPr id="6" name="矩形 5">
+              <a:extLst>
+                <a:ext uri="{FF2B5EF4-FFF2-40B4-BE49-F238E27FC236}">
+                  <a16:creationId xmlns:a16="http://schemas.microsoft.com/office/drawing/2014/main" id="{464AC356-2D01-5313-EAC8-6BF8121A0B55}"/>
+                </a:ext>
+              </a:extLst>
+            </p:cNvPr>
+            <p:cNvSpPr/>
+            <p:nvPr/>
+          </p:nvSpPr>
+          <p:spPr>
+            <a:xfrm>
+              <a:off x="10340785" y="-7"/>
+              <a:ext cx="1666001" cy="637074"/>
+            </a:xfrm>
+            <a:prstGeom prst="rect">
+              <a:avLst/>
+            </a:prstGeom>
+            <a:solidFill>
+              <a:srgbClr val="005375"/>
+            </a:solidFill>
+            <a:ln>
+              <a:noFill/>
+            </a:ln>
+          </p:spPr>
+          <p:style>
+            <a:lnRef idx="2">
+              <a:schemeClr val="accent1">
+                <a:shade val="50000"/>
+              </a:schemeClr>
+            </a:lnRef>
+            <a:fillRef idx="1">
+              <a:schemeClr val="accent1"/>
+            </a:fillRef>
+            <a:effectRef idx="0">
+              <a:schemeClr val="accent1"/>
+            </a:effectRef>
+            <a:fontRef idx="minor">
+              <a:schemeClr val="lt1"/>
+            </a:fontRef>
+          </p:style>
+          <p:txBody>
+            <a:bodyPr rtlCol="0" anchor="ctr"/>
+            <a:lstStyle/>
+            <a:p>
+              <a:pPr algn="ctr"/>
+              <a:endParaRPr lang="zh-CN" altLang="en-US" sz="2400" b="1" dirty="0">
+                <a:solidFill>
+                  <a:schemeClr val="bg1"/>
+                </a:solidFill>
+              </a:endParaRPr>
+            </a:p>
+          </p:txBody>
+        </p:sp>
+        <p:sp>
+          <p:nvSpPr>
+            <p:cNvPr id="7" name="TextBox 7">
+              <a:extLst>
+                <a:ext uri="{FF2B5EF4-FFF2-40B4-BE49-F238E27FC236}">
+                  <a16:creationId xmlns:a16="http://schemas.microsoft.com/office/drawing/2014/main" id="{F4001A00-61F3-4876-5CB3-1002C14883B3}"/>
+                </a:ext>
+              </a:extLst>
+            </p:cNvPr>
+            <p:cNvSpPr txBox="1"/>
+            <p:nvPr/>
+          </p:nvSpPr>
+          <p:spPr>
+            <a:xfrm>
+              <a:off x="5661252" y="146954"/>
+              <a:ext cx="1344000" cy="343159"/>
+            </a:xfrm>
+            <a:prstGeom prst="rect">
+              <a:avLst/>
+            </a:prstGeom>
+            <a:noFill/>
+          </p:spPr>
+          <p:txBody>
+            <a:bodyPr wrap="square" lIns="0" tIns="48000" rIns="0" bIns="48000" rtlCol="0">
+              <a:spAutoFit/>
+            </a:bodyPr>
+            <a:lstStyle/>
+            <a:p>
+              <a:pPr algn="ctr"/>
+              <a:r>
+                <a:rPr lang="zh-CN" altLang="en-US" sz="1600" b="1" dirty="0">
+                  <a:solidFill>
+                    <a:schemeClr val="bg1">
+                      <a:lumMod val="50000"/>
+                    </a:schemeClr>
+                  </a:solidFill>
+                  <a:latin typeface="微软雅黑" panose="020B0503020204020204" pitchFamily="34" charset="-122"/>
+                  <a:ea typeface="微软雅黑" panose="020B0503020204020204" pitchFamily="34" charset="-122"/>
+                </a:rPr>
+                <a:t>开发历程</a:t>
+              </a:r>
+            </a:p>
+          </p:txBody>
+        </p:sp>
+        <p:sp>
+          <p:nvSpPr>
+            <p:cNvPr id="8" name="TextBox 9">
+              <a:extLst>
+                <a:ext uri="{FF2B5EF4-FFF2-40B4-BE49-F238E27FC236}">
+                  <a16:creationId xmlns:a16="http://schemas.microsoft.com/office/drawing/2014/main" id="{BFEDC18E-5B2A-7981-D0D8-2B63D3B3CA08}"/>
+                </a:ext>
+              </a:extLst>
+            </p:cNvPr>
+            <p:cNvSpPr txBox="1"/>
+            <p:nvPr/>
+          </p:nvSpPr>
+          <p:spPr>
+            <a:xfrm>
+              <a:off x="7274764" y="146951"/>
+              <a:ext cx="1344000" cy="343159"/>
+            </a:xfrm>
+            <a:prstGeom prst="rect">
+              <a:avLst/>
+            </a:prstGeom>
+            <a:noFill/>
+          </p:spPr>
+          <p:txBody>
+            <a:bodyPr wrap="square" lIns="0" tIns="48000" rIns="0" bIns="48000" rtlCol="0">
+              <a:spAutoFit/>
+            </a:bodyPr>
+            <a:lstStyle/>
+            <a:p>
+              <a:pPr algn="ctr"/>
+              <a:r>
+                <a:rPr lang="zh-CN" altLang="en-US" sz="1600" b="1" dirty="0">
+                  <a:solidFill>
+                    <a:schemeClr val="bg1">
+                      <a:lumMod val="50000"/>
+                    </a:schemeClr>
+                  </a:solidFill>
+                  <a:latin typeface="微软雅黑" panose="020B0503020204020204" pitchFamily="34" charset="-122"/>
+                  <a:ea typeface="微软雅黑" panose="020B0503020204020204" pitchFamily="34" charset="-122"/>
+                </a:rPr>
+                <a:t>核心功能</a:t>
+              </a:r>
+            </a:p>
+          </p:txBody>
+        </p:sp>
+        <p:sp>
+          <p:nvSpPr>
+            <p:cNvPr id="9" name="TextBox 10">
+              <a:extLst>
+                <a:ext uri="{FF2B5EF4-FFF2-40B4-BE49-F238E27FC236}">
+                  <a16:creationId xmlns:a16="http://schemas.microsoft.com/office/drawing/2014/main" id="{D7802EEF-7C2F-9D01-18DE-7130E2FB9B8A}"/>
+                </a:ext>
+              </a:extLst>
+            </p:cNvPr>
+            <p:cNvSpPr txBox="1"/>
+            <p:nvPr/>
+          </p:nvSpPr>
+          <p:spPr>
+            <a:xfrm>
+              <a:off x="8888274" y="146951"/>
+              <a:ext cx="1344000" cy="343159"/>
+            </a:xfrm>
+            <a:prstGeom prst="rect">
+              <a:avLst/>
+            </a:prstGeom>
+            <a:noFill/>
+          </p:spPr>
+          <p:txBody>
+            <a:bodyPr wrap="square" lIns="0" tIns="48000" rIns="0" bIns="48000" rtlCol="0">
+              <a:spAutoFit/>
+            </a:bodyPr>
+            <a:lstStyle/>
+            <a:p>
+              <a:pPr algn="ctr"/>
+              <a:r>
+                <a:rPr lang="zh-CN" altLang="en-US" sz="1600" b="1" dirty="0">
+                  <a:solidFill>
+                    <a:schemeClr val="bg1">
+                      <a:lumMod val="50000"/>
+                    </a:schemeClr>
+                  </a:solidFill>
+                  <a:latin typeface="微软雅黑" panose="020B0503020204020204" pitchFamily="34" charset="-122"/>
+                </a:rPr>
+                <a:t>团队协作</a:t>
+              </a:r>
+            </a:p>
+          </p:txBody>
+        </p:sp>
+        <p:sp>
+          <p:nvSpPr>
+            <p:cNvPr id="10" name="TextBox 11">
+              <a:extLst>
+                <a:ext uri="{FF2B5EF4-FFF2-40B4-BE49-F238E27FC236}">
+                  <a16:creationId xmlns:a16="http://schemas.microsoft.com/office/drawing/2014/main" id="{8D03D3A1-0F8F-BBFD-47AF-73B47EC2E632}"/>
+                </a:ext>
+              </a:extLst>
+            </p:cNvPr>
+            <p:cNvSpPr txBox="1"/>
+            <p:nvPr/>
+          </p:nvSpPr>
+          <p:spPr>
+            <a:xfrm>
+              <a:off x="10501786" y="146952"/>
+              <a:ext cx="1344000" cy="343159"/>
+            </a:xfrm>
+            <a:prstGeom prst="rect">
+              <a:avLst/>
+            </a:prstGeom>
+            <a:noFill/>
+          </p:spPr>
+          <p:txBody>
+            <a:bodyPr wrap="square" lIns="0" tIns="48000" rIns="0" bIns="48000" rtlCol="0">
+              <a:spAutoFit/>
+            </a:bodyPr>
+            <a:lstStyle/>
+            <a:p>
+              <a:pPr algn="ctr"/>
+              <a:r>
+                <a:rPr lang="zh-CN" altLang="en-US" sz="1600" b="1" dirty="0">
+                  <a:solidFill>
+                    <a:schemeClr val="bg1"/>
+                  </a:solidFill>
+                  <a:latin typeface="微软雅黑" panose="020B0503020204020204" pitchFamily="34" charset="-122"/>
+                  <a:ea typeface="微软雅黑" panose="020B0503020204020204" pitchFamily="34" charset="-122"/>
+                </a:rPr>
+                <a:t>总结展望</a:t>
+              </a:r>
+            </a:p>
+          </p:txBody>
+        </p:sp>
+        <p:pic>
+          <p:nvPicPr>
+            <p:cNvPr id="11" name="图片 10" descr="hitsz-logo">
+              <a:extLst>
+                <a:ext uri="{FF2B5EF4-FFF2-40B4-BE49-F238E27FC236}">
+                  <a16:creationId xmlns:a16="http://schemas.microsoft.com/office/drawing/2014/main" id="{4C8EB69F-EB12-6AF2-7D2D-2FD791950989}"/>
+                </a:ext>
+              </a:extLst>
+            </p:cNvPr>
+            <p:cNvPicPr>
+              <a:picLocks noChangeAspect="1"/>
+            </p:cNvPicPr>
+            <p:nvPr/>
+          </p:nvPicPr>
+          <p:blipFill>
+            <a:blip r:embed="rId2">
+              <a:clrChange>
+                <a:clrFrom>
+                  <a:srgbClr val="FFFFFF">
+                    <a:alpha val="100000"/>
+                  </a:srgbClr>
+                </a:clrFrom>
+                <a:clrTo>
+                  <a:srgbClr val="FFFFFF">
+                    <a:alpha val="100000"/>
+                    <a:alpha val="0"/>
+                  </a:srgbClr>
+                </a:clrTo>
+              </a:clrChange>
+            </a:blip>
+            <a:stretch>
+              <a:fillRect/>
+            </a:stretch>
+          </p:blipFill>
+          <p:spPr>
+            <a:xfrm>
+              <a:off x="559461" y="57784"/>
+              <a:ext cx="2829813" cy="521503"/>
+            </a:xfrm>
+            <a:prstGeom prst="rect">
+              <a:avLst/>
+            </a:prstGeom>
+          </p:spPr>
+        </p:pic>
+        <p:sp>
+          <p:nvSpPr>
+            <p:cNvPr id="12" name="TextBox 6">
+              <a:extLst>
+                <a:ext uri="{FF2B5EF4-FFF2-40B4-BE49-F238E27FC236}">
+                  <a16:creationId xmlns:a16="http://schemas.microsoft.com/office/drawing/2014/main" id="{EBE6E26D-1FBD-28E0-FB9E-61AFD7BC1995}"/>
+                </a:ext>
+              </a:extLst>
+            </p:cNvPr>
+            <p:cNvSpPr txBox="1"/>
+            <p:nvPr/>
+          </p:nvSpPr>
+          <p:spPr>
+            <a:xfrm>
+              <a:off x="4017261" y="146951"/>
+              <a:ext cx="1344000" cy="343159"/>
+            </a:xfrm>
+            <a:prstGeom prst="rect">
+              <a:avLst/>
+            </a:prstGeom>
+            <a:noFill/>
+          </p:spPr>
+          <p:txBody>
+            <a:bodyPr wrap="square" lIns="0" tIns="48000" rIns="0" bIns="48000" rtlCol="0">
+              <a:spAutoFit/>
+            </a:bodyPr>
+            <a:lstStyle/>
+            <a:p>
+              <a:pPr algn="ctr"/>
+              <a:r>
+                <a:rPr lang="zh-CN" altLang="en-US" sz="1600" b="1" dirty="0">
+                  <a:solidFill>
+                    <a:schemeClr val="bg1">
+                      <a:lumMod val="50000"/>
+                    </a:schemeClr>
+                  </a:solidFill>
+                  <a:latin typeface="微软雅黑" panose="020B0503020204020204" pitchFamily="34" charset="-122"/>
+                  <a:ea typeface="微软雅黑" panose="020B0503020204020204" pitchFamily="34" charset="-122"/>
+                </a:rPr>
+                <a:t>完成情况</a:t>
+              </a:r>
+            </a:p>
+          </p:txBody>
+        </p:sp>
+      </p:grpSp>
+      <p:sp>
+        <p:nvSpPr>
+          <p:cNvPr id="15" name="文本框 14">
+            <a:extLst>
+              <a:ext uri="{FF2B5EF4-FFF2-40B4-BE49-F238E27FC236}">
+                <a16:creationId xmlns:a16="http://schemas.microsoft.com/office/drawing/2014/main" id="{2CC3E3CA-DB01-6F1A-C2E2-24EE2C2C1E57}"/>
+              </a:ext>
+            </a:extLst>
+          </p:cNvPr>
+          <p:cNvSpPr txBox="1"/>
+          <p:nvPr/>
+        </p:nvSpPr>
+        <p:spPr>
+          <a:xfrm>
+            <a:off x="1176689" y="1095494"/>
+            <a:ext cx="2598420" cy="461665"/>
+          </a:xfrm>
+          <a:prstGeom prst="rect">
+            <a:avLst/>
+          </a:prstGeom>
+          <a:noFill/>
+        </p:spPr>
+        <p:txBody>
+          <a:bodyPr wrap="square">
+            <a:spAutoFit/>
+          </a:bodyPr>
+          <a:lstStyle/>
+          <a:p>
+            <a:r>
+              <a:rPr lang="zh-CN" altLang="en-US" sz="2400" b="1" dirty="0">
+                <a:solidFill>
+                  <a:srgbClr val="005375"/>
+                </a:solidFill>
+              </a:rPr>
+              <a:t>参考项目</a:t>
+            </a:r>
+          </a:p>
+        </p:txBody>
+      </p:sp>
+      <p:sp>
+        <p:nvSpPr>
+          <p:cNvPr id="16" name="文本框 15">
+            <a:extLst>
+              <a:ext uri="{FF2B5EF4-FFF2-40B4-BE49-F238E27FC236}">
+                <a16:creationId xmlns:a16="http://schemas.microsoft.com/office/drawing/2014/main" id="{5EE47636-9248-CC66-0745-0F2C705871C8}"/>
+              </a:ext>
+            </a:extLst>
+          </p:cNvPr>
+          <p:cNvSpPr txBox="1"/>
+          <p:nvPr/>
+        </p:nvSpPr>
+        <p:spPr>
+          <a:xfrm>
+            <a:off x="1409982" y="1758970"/>
+            <a:ext cx="7103342" cy="369332"/>
+          </a:xfrm>
+          <a:prstGeom prst="rect">
+            <a:avLst/>
+          </a:prstGeom>
+          <a:noFill/>
+        </p:spPr>
+        <p:txBody>
+          <a:bodyPr wrap="square">
+            <a:spAutoFit/>
+          </a:bodyPr>
+          <a:lstStyle/>
+          <a:p>
+            <a:r>
+              <a:rPr lang="zh-CN" altLang="en-US" sz="1800" dirty="0">
+                <a:solidFill>
+                  <a:srgbClr val="000000"/>
+                </a:solidFill>
+                <a:effectLst/>
+                <a:latin typeface="NotoSerifCJKsc-Bold"/>
+              </a:rPr>
+              <a:t>内核开发过程中，我们在内核开发各个领域受到以下项目的启发：</a:t>
+            </a:r>
+            <a:endParaRPr lang="zh-CN" altLang="en-US" dirty="0"/>
+          </a:p>
+        </p:txBody>
+      </p:sp>
+      <p:sp>
+        <p:nvSpPr>
+          <p:cNvPr id="19" name="文本框 18">
+            <a:extLst>
+              <a:ext uri="{FF2B5EF4-FFF2-40B4-BE49-F238E27FC236}">
+                <a16:creationId xmlns:a16="http://schemas.microsoft.com/office/drawing/2014/main" id="{7722A97A-2654-2256-5FA1-D5E091D2DF5E}"/>
+              </a:ext>
+            </a:extLst>
+          </p:cNvPr>
+          <p:cNvSpPr txBox="1"/>
+          <p:nvPr/>
+        </p:nvSpPr>
+        <p:spPr>
+          <a:xfrm>
+            <a:off x="1409981" y="2330113"/>
+            <a:ext cx="9846541" cy="3416320"/>
+          </a:xfrm>
+          <a:prstGeom prst="rect">
+            <a:avLst/>
+          </a:prstGeom>
+          <a:noFill/>
+        </p:spPr>
+        <p:txBody>
+          <a:bodyPr wrap="square">
+            <a:spAutoFit/>
+          </a:bodyPr>
+          <a:lstStyle/>
+          <a:p>
+            <a:r>
+              <a:rPr lang="zh-CN" altLang="en-US" dirty="0"/>
+              <a:t>网络，进程通信部分：</a:t>
+            </a:r>
+            <a:r>
+              <a:rPr lang="zh-CN" altLang="en-US" b="1" dirty="0"/>
+              <a:t>PhoenixOS</a:t>
+            </a:r>
+            <a:r>
+              <a:rPr lang="zh-CN" altLang="en-US" dirty="0"/>
+              <a:t>（</a:t>
+            </a:r>
+            <a:r>
+              <a:rPr lang="zh-CN" altLang="en-US" dirty="0">
+                <a:hlinkClick r:id="rId3"/>
+              </a:rPr>
+              <a:t>https://github.com/oscomp/first-prize-osk2024</a:t>
+            </a:r>
+            <a:r>
+              <a:rPr lang="en-US" altLang="zh-CN" dirty="0">
+                <a:hlinkClick r:id="rId3"/>
+              </a:rPr>
+              <a:t>-</a:t>
+            </a:r>
+            <a:r>
+              <a:rPr lang="zh-CN" altLang="en-US" dirty="0">
+                <a:hlinkClick r:id="rId3"/>
+              </a:rPr>
+              <a:t>phoenix</a:t>
+            </a:r>
+            <a:r>
+              <a:rPr lang="zh-CN" altLang="en-US" dirty="0"/>
+              <a:t>）</a:t>
+            </a:r>
+            <a:endParaRPr lang="en-US" altLang="zh-CN" dirty="0"/>
+          </a:p>
+          <a:p>
+            <a:endParaRPr lang="en-US" altLang="zh-CN" dirty="0"/>
+          </a:p>
+          <a:p>
+            <a:r>
+              <a:rPr lang="zh-CN" altLang="en-US" dirty="0"/>
+              <a:t>锁部分：</a:t>
+            </a:r>
+            <a:r>
+              <a:rPr lang="zh-CN" altLang="en-US" b="1" dirty="0"/>
+              <a:t>TitanixOS</a:t>
+            </a:r>
+            <a:r>
+              <a:rPr lang="zh-CN" altLang="en-US" dirty="0"/>
+              <a:t>（</a:t>
+            </a:r>
+            <a:r>
+              <a:rPr lang="zh-CN" altLang="en-US" dirty="0">
+                <a:hlinkClick r:id="rId4"/>
+              </a:rPr>
+              <a:t>https://gitlab.eduxiji.net/202318123101314/oskernel2023-Titanix</a:t>
+            </a:r>
+            <a:r>
+              <a:rPr lang="zh-CN" altLang="en-US" dirty="0"/>
+              <a:t>）</a:t>
+            </a:r>
+            <a:endParaRPr lang="en-US" altLang="zh-CN" dirty="0"/>
+          </a:p>
+          <a:p>
+            <a:endParaRPr lang="en-US" altLang="zh-CN" dirty="0"/>
+          </a:p>
+          <a:p>
+            <a:r>
+              <a:rPr lang="zh-CN" altLang="en-US" dirty="0"/>
+              <a:t>异步协程调度：</a:t>
+            </a:r>
+            <a:r>
+              <a:rPr lang="zh-CN" altLang="en-US" b="1" dirty="0"/>
+              <a:t>MinotaurOS</a:t>
+            </a:r>
+            <a:r>
+              <a:rPr lang="zh-CN" altLang="en-US" dirty="0"/>
+              <a:t>（</a:t>
+            </a:r>
+            <a:r>
+              <a:rPr lang="zh-CN" altLang="en-US" dirty="0">
+                <a:hlinkClick r:id="rId5"/>
+              </a:rPr>
+              <a:t>https://github.com/oscomp/first-prize-osk2024-minotauros</a:t>
+            </a:r>
+            <a:r>
+              <a:rPr lang="zh-CN" altLang="en-US" dirty="0"/>
+              <a:t>）</a:t>
+            </a:r>
+            <a:endParaRPr lang="en-US" altLang="zh-CN" dirty="0"/>
+          </a:p>
+          <a:p>
+            <a:endParaRPr lang="en-US" altLang="zh-CN" dirty="0"/>
+          </a:p>
+          <a:p>
+            <a:r>
+              <a:rPr lang="zh-CN" altLang="en-US" dirty="0"/>
+              <a:t>用户态程序：</a:t>
+            </a:r>
+            <a:r>
+              <a:rPr lang="zh-CN" altLang="en-US" b="1" dirty="0"/>
+              <a:t>rcore-os/rCore</a:t>
+            </a:r>
+            <a:r>
+              <a:rPr lang="zh-CN" altLang="en-US" dirty="0"/>
+              <a:t>（</a:t>
+            </a:r>
+            <a:r>
+              <a:rPr lang="zh-CN" altLang="en-US" dirty="0">
+                <a:hlinkClick r:id="rId6"/>
+              </a:rPr>
+              <a:t>https://github.com/rcore-os/rCore</a:t>
+            </a:r>
+            <a:r>
+              <a:rPr lang="zh-CN" altLang="en-US" dirty="0"/>
+              <a:t>）</a:t>
+            </a:r>
+            <a:endParaRPr lang="en-US" altLang="zh-CN" dirty="0"/>
+          </a:p>
+          <a:p>
+            <a:endParaRPr lang="en-US" altLang="zh-CN" dirty="0"/>
+          </a:p>
+          <a:p>
+            <a:r>
+              <a:rPr lang="zh-CN" altLang="en-US" dirty="0"/>
+              <a:t>多架构设计：</a:t>
+            </a:r>
+            <a:r>
+              <a:rPr lang="zh-CN" altLang="en-US" b="1" dirty="0"/>
+              <a:t>polyhal</a:t>
+            </a:r>
+            <a:r>
+              <a:rPr lang="zh-CN" altLang="en-US" dirty="0"/>
+              <a:t>（</a:t>
+            </a:r>
+            <a:r>
+              <a:rPr lang="zh-CN" altLang="en-US" dirty="0">
+                <a:hlinkClick r:id="rId7"/>
+              </a:rPr>
+              <a:t>https://github.com/Byte-OS/polyhal</a:t>
+            </a:r>
+            <a:r>
+              <a:rPr lang="zh-CN" altLang="en-US" dirty="0"/>
+              <a:t>）</a:t>
+            </a:r>
+            <a:endParaRPr lang="en-US" altLang="zh-CN" dirty="0"/>
+          </a:p>
+          <a:p>
+            <a:endParaRPr lang="zh-CN" altLang="en-US" dirty="0"/>
+          </a:p>
+          <a:p>
+            <a:r>
+              <a:rPr lang="zh-CN" altLang="en-US" dirty="0"/>
+              <a:t>项目文档：</a:t>
+            </a:r>
+            <a:r>
+              <a:rPr lang="zh-CN" altLang="en-US" b="1" dirty="0"/>
+              <a:t>PhoenixOS</a:t>
+            </a:r>
+            <a:r>
+              <a:rPr lang="zh-CN" altLang="en-US" dirty="0"/>
+              <a:t>（</a:t>
+            </a:r>
+            <a:r>
+              <a:rPr lang="zh-CN" altLang="en-US" dirty="0">
+                <a:hlinkClick r:id="rId3"/>
+              </a:rPr>
+              <a:t>https://github.com/oscomp/first-prize-osk2024-phoenix</a:t>
+            </a:r>
+            <a:r>
+              <a:rPr lang="zh-CN" altLang="en-US" dirty="0"/>
+              <a:t>）</a:t>
+            </a:r>
+            <a:endParaRPr lang="en-US" altLang="zh-CN" dirty="0"/>
+          </a:p>
+          <a:p>
+            <a:r>
+              <a:rPr lang="en-US" altLang="zh-CN" dirty="0"/>
+              <a:t>	     </a:t>
+            </a:r>
+            <a:r>
+              <a:rPr lang="zh-CN" altLang="en-US" b="1" dirty="0"/>
+              <a:t>MankorOS</a:t>
+            </a:r>
+            <a:r>
+              <a:rPr lang="zh-CN" altLang="en-US" dirty="0"/>
+              <a:t>（</a:t>
+            </a:r>
+            <a:r>
+              <a:rPr lang="zh-CN" altLang="en-US" dirty="0">
+                <a:hlinkClick r:id="rId8"/>
+              </a:rPr>
+              <a:t>https://gitlab.eduxiji.net/MankorOS/OSKernel2023-MankorOS</a:t>
+            </a:r>
+            <a:r>
+              <a:rPr lang="zh-CN" altLang="en-US" dirty="0"/>
+              <a:t>）</a:t>
+            </a:r>
+            <a:endParaRPr lang="en-US" altLang="zh-CN" dirty="0"/>
+          </a:p>
+        </p:txBody>
+      </p:sp>
+      <p:sp>
+        <p:nvSpPr>
+          <p:cNvPr id="28" name="文本框 27">
+            <a:extLst>
+              <a:ext uri="{FF2B5EF4-FFF2-40B4-BE49-F238E27FC236}">
+                <a16:creationId xmlns:a16="http://schemas.microsoft.com/office/drawing/2014/main" id="{EE069202-165D-2B3A-20CB-F76EFFB549AA}"/>
+              </a:ext>
+            </a:extLst>
+          </p:cNvPr>
+          <p:cNvSpPr txBox="1"/>
+          <p:nvPr/>
+        </p:nvSpPr>
+        <p:spPr>
+          <a:xfrm>
+            <a:off x="1409981" y="5948244"/>
+            <a:ext cx="6370320" cy="461665"/>
+          </a:xfrm>
+          <a:prstGeom prst="rect">
+            <a:avLst/>
+          </a:prstGeom>
+          <a:noFill/>
+        </p:spPr>
+        <p:txBody>
+          <a:bodyPr wrap="square">
+            <a:spAutoFit/>
+          </a:bodyPr>
+          <a:lstStyle/>
+          <a:p>
+            <a:r>
+              <a:rPr lang="zh-CN" altLang="en-US" sz="2400" b="1" dirty="0">
+                <a:solidFill>
+                  <a:srgbClr val="005375"/>
+                </a:solidFill>
+              </a:rPr>
+              <a:t>衷心感谢以上前辈项目的启发！</a:t>
+            </a:r>
+          </a:p>
+        </p:txBody>
+      </p:sp>
+    </p:spTree>
+    <p:extLst>
+      <p:ext uri="{BB962C8B-B14F-4D97-AF65-F5344CB8AC3E}">
+        <p14:creationId xmlns:p14="http://schemas.microsoft.com/office/powerpoint/2010/main" val="343499293"/>
+      </p:ext>
+    </p:extLst>
+  </p:cSld>
+  <p:clrMapOvr>
+    <a:masterClrMapping/>
+  </p:clrMapOvr>
+</p:sld>
+</file>
+
 <file path=ppt/slides/slide2.xml><?xml version="1.0" encoding="utf-8"?>
 <p:sld xmlns:a="http://schemas.openxmlformats.org/drawingml/2006/main" xmlns:r="http://schemas.openxmlformats.org/officeDocument/2006/relationships" xmlns:p="http://schemas.openxmlformats.org/presentationml/2006/main">
   <p:cSld>
@@ -4967,7 +5766,7 @@
             </a:r>
             <a:r>
               <a:rPr lang="en-US" altLang="zh-CN" dirty="0"/>
-              <a:t>_1519_</a:t>
+              <a:t>1519</a:t>
             </a:r>
             <a:r>
               <a:rPr lang="zh-CN" altLang="en-US" dirty="0"/>
@@ -4975,7 +5774,7 @@
             </a:r>
             <a:r>
               <a:rPr lang="en-US" altLang="zh-CN" dirty="0"/>
-              <a:t>_7_</a:t>
+              <a:t>7</a:t>
             </a:r>
             <a:r>
               <a:rPr lang="zh-CN" altLang="en-US" dirty="0"/>
@@ -6615,7 +7414,7 @@
         <p:spPr>
           <a:xfrm>
             <a:off x="1287329" y="1669477"/>
-            <a:ext cx="6200591" cy="522707"/>
+            <a:ext cx="10048614" cy="522707"/>
           </a:xfrm>
           <a:prstGeom prst="rect">
             <a:avLst/>
@@ -6640,25 +7439,7 @@
                 <a:cs typeface="微软雅黑" panose="020B0503020204020204" pitchFamily="34" charset="-122"/>
                 <a:sym typeface="+mn-ea"/>
               </a:rPr>
-              <a:t>从零开始构建，部分结构借鉴往届</a:t>
-            </a:r>
-            <a:r>
-              <a:rPr lang="en-US" altLang="zh-CN" sz="2000" dirty="0">
-                <a:latin typeface="微软雅黑" panose="020B0503020204020204" pitchFamily="34" charset="-122"/>
-                <a:ea typeface="微软雅黑" panose="020B0503020204020204" pitchFamily="34" charset="-122"/>
-                <a:cs typeface="微软雅黑" panose="020B0503020204020204" pitchFamily="34" charset="-122"/>
-                <a:sym typeface="+mn-ea"/>
-              </a:rPr>
-              <a:t>Phoenix</a:t>
-            </a:r>
-            <a:r>
-              <a:rPr lang="zh-CN" altLang="en-US" sz="2000" dirty="0">
-                <a:latin typeface="微软雅黑" panose="020B0503020204020204" pitchFamily="34" charset="-122"/>
-                <a:ea typeface="微软雅黑" panose="020B0503020204020204" pitchFamily="34" charset="-122"/>
-                <a:cs typeface="微软雅黑" panose="020B0503020204020204" pitchFamily="34" charset="-122"/>
-                <a:sym typeface="+mn-ea"/>
-              </a:rPr>
-              <a:t>内核</a:t>
+              <a:t>从零开始构建，部分结构编写时借鉴往届内核构建方法（详见幻灯片最后一页参考项目）</a:t>
             </a:r>
             <a:endParaRPr lang="en-US" altLang="zh-CN" sz="2000" dirty="0">
               <a:latin typeface="微软雅黑" panose="020B0503020204020204" pitchFamily="34" charset="-122"/>
@@ -11690,13 +12471,22 @@
               </a:lnSpc>
             </a:pPr>
             <a:r>
-              <a:rPr lang="en-US" altLang="zh-CN" sz="2000" dirty="0">
+              <a:rPr lang="en-US" altLang="zh-CN" sz="2000">
                 <a:latin typeface="微软雅黑" panose="020B0503020204020204" pitchFamily="34" charset="-122"/>
                 <a:ea typeface="微软雅黑" panose="020B0503020204020204" pitchFamily="34" charset="-122"/>
                 <a:cs typeface="微软雅黑" panose="020B0503020204020204" pitchFamily="34" charset="-122"/>
                 <a:sym typeface="+mn-ea"/>
               </a:rPr>
-              <a:t>2700</a:t>
+              <a:t>20000+</a:t>
+            </a:r>
+            <a:r>
+              <a:rPr lang="zh-CN" altLang="en-US" sz="2000">
+                <a:latin typeface="微软雅黑" panose="020B0503020204020204" pitchFamily="34" charset="-122"/>
+                <a:ea typeface="微软雅黑" panose="020B0503020204020204" pitchFamily="34" charset="-122"/>
+                <a:cs typeface="微软雅黑" panose="020B0503020204020204" pitchFamily="34" charset="-122"/>
+                <a:sym typeface="+mn-ea"/>
+              </a:rPr>
+              <a:t>行</a:t>
             </a:r>
             <a:r>
               <a:rPr lang="zh-CN" altLang="en-US" sz="2000" dirty="0">
@@ -11705,7 +12495,7 @@
                 <a:cs typeface="微软雅黑" panose="020B0503020204020204" pitchFamily="34" charset="-122"/>
                 <a:sym typeface="+mn-ea"/>
               </a:rPr>
-              <a:t>行自主编写的内核代码</a:t>
+              <a:t>自主编写的内核代码</a:t>
             </a:r>
             <a:endParaRPr lang="en-US" altLang="zh-CN" sz="2000" dirty="0">
               <a:latin typeface="微软雅黑" panose="020B0503020204020204" pitchFamily="34" charset="-122"/>
@@ -12844,7 +13634,7 @@
                   <a:srgbClr val="005375"/>
                 </a:solidFill>
               </a:rPr>
-              <a:t>初赛经验总结</a:t>
+              <a:t>初赛开发经验总结</a:t>
             </a:r>
           </a:p>
         </p:txBody>

</xml_diff>